<commit_message>
fixed bug on add_content_slide
</commit_message>
<xml_diff>
--- a/sample_output/sample2_using_template.pptx
+++ b/sample_output/sample2_using_template.pptx
@@ -5911,61 +5911,7 @@
       <p:grpSpPr/>
       <p:sp>
         <p:nvSpPr>
-          <p:cNvPr id="2" name="Rectangle 1"/>
-          <p:cNvSpPr/>
-          <p:nvPr/>
-        </p:nvSpPr>
-        <p:spPr>
-          <a:xfrm>
-            <a:off x="0" y="685800"/>
-            <a:ext cx="12192000" cy="137160"/>
-          </a:xfrm>
-          <a:prstGeom prst="rect">
-            <a:avLst/>
-          </a:prstGeom>
-          <a:gradFill rotWithShape="1">
-            <a:gsLst>
-              <a:gs pos="0">
-                <a:srgbClr val="E0E5F7"/>
-              </a:gs>
-              <a:gs pos="100000">
-                <a:srgbClr val="95ABEA"/>
-              </a:gs>
-            </a:gsLst>
-            <a:lin scaled="0" ang="0"/>
-          </a:gradFill>
-          <a:ln w="1">
-            <a:solidFill>
-              <a:srgbClr val="FFFFFF"/>
-            </a:solidFill>
-          </a:ln>
-          <a:effectLst/>
-        </p:spPr>
-        <p:style>
-          <a:lnRef idx="1">
-            <a:schemeClr val="accent1"/>
-          </a:lnRef>
-          <a:fillRef idx="3">
-            <a:schemeClr val="accent1"/>
-          </a:fillRef>
-          <a:effectRef idx="2">
-            <a:schemeClr val="accent1"/>
-          </a:effectRef>
-          <a:fontRef idx="minor">
-            <a:schemeClr val="lt1"/>
-          </a:fontRef>
-        </p:style>
-        <p:txBody>
-          <a:bodyPr rtlCol="0" anchor="ctr"/>
-          <a:lstStyle/>
-          <a:p>
-            <a:pPr algn="ctr"/>
-          </a:p>
-        </p:txBody>
-      </p:sp>
-      <p:sp>
-        <p:nvSpPr>
-          <p:cNvPr id="3" name="TextBox 2"/>
+          <p:cNvPr id="2" name="TextBox 1"/>
           <p:cNvSpPr txBox="1"/>
           <p:nvPr/>
         </p:nvSpPr>
@@ -6000,7 +5946,7 @@
       </p:sp>
       <p:pic>
         <p:nvPicPr>
-          <p:cNvPr id="4" name="Picture 3" descr="01_Slide1.png"/>
+          <p:cNvPr id="3" name="Picture 2" descr="01_Slide1.png"/>
           <p:cNvPicPr>
             <a:picLocks noChangeAspect="1"/>
           </p:cNvPicPr>
@@ -6024,7 +5970,7 @@
       </p:pic>
       <p:sp>
         <p:nvSpPr>
-          <p:cNvPr id="5" name="TextBox 4"/>
+          <p:cNvPr id="4" name="TextBox 3"/>
           <p:cNvSpPr txBox="1"/>
           <p:nvPr/>
         </p:nvSpPr>
@@ -6059,7 +6005,7 @@
       </p:sp>
       <p:pic>
         <p:nvPicPr>
-          <p:cNvPr id="6" name="Picture 5" descr="02_Slide2.png"/>
+          <p:cNvPr id="5" name="Picture 4" descr="02_Slide2.png"/>
           <p:cNvPicPr>
             <a:picLocks noChangeAspect="1"/>
           </p:cNvPicPr>
@@ -6083,7 +6029,7 @@
       </p:pic>
       <p:sp>
         <p:nvSpPr>
-          <p:cNvPr id="7" name="TextBox 6"/>
+          <p:cNvPr id="6" name="TextBox 5"/>
           <p:cNvSpPr txBox="1"/>
           <p:nvPr/>
         </p:nvSpPr>
@@ -6118,7 +6064,7 @@
       </p:sp>
       <p:pic>
         <p:nvPicPr>
-          <p:cNvPr id="8" name="Picture 7" descr="03_Slide3.png"/>
+          <p:cNvPr id="7" name="Picture 6" descr="03_Slide3.png"/>
           <p:cNvPicPr>
             <a:picLocks noChangeAspect="1"/>
           </p:cNvPicPr>
@@ -6142,7 +6088,7 @@
       </p:pic>
       <p:sp>
         <p:nvSpPr>
-          <p:cNvPr id="9" name="TextBox 8"/>
+          <p:cNvPr id="8" name="TextBox 7"/>
           <p:cNvSpPr txBox="1"/>
           <p:nvPr/>
         </p:nvSpPr>
@@ -6177,7 +6123,7 @@
       </p:sp>
       <p:pic>
         <p:nvPicPr>
-          <p:cNvPr id="10" name="Picture 9" descr="04_Slide4.png"/>
+          <p:cNvPr id="9" name="Picture 8" descr="04_Slide4.png"/>
           <p:cNvPicPr>
             <a:picLocks noChangeAspect="1"/>
           </p:cNvPicPr>
@@ -6201,7 +6147,7 @@
       </p:pic>
       <p:sp>
         <p:nvSpPr>
-          <p:cNvPr id="11" name="TextBox 10"/>
+          <p:cNvPr id="10" name="TextBox 9"/>
           <p:cNvSpPr txBox="1"/>
           <p:nvPr/>
         </p:nvSpPr>
@@ -6236,7 +6182,7 @@
       </p:sp>
       <p:pic>
         <p:nvPicPr>
-          <p:cNvPr id="12" name="Picture 11" descr="05_Slide5.png"/>
+          <p:cNvPr id="11" name="Picture 10" descr="05_Slide5.png"/>
           <p:cNvPicPr>
             <a:picLocks noChangeAspect="1"/>
           </p:cNvPicPr>
@@ -6260,7 +6206,7 @@
       </p:pic>
       <p:sp>
         <p:nvSpPr>
-          <p:cNvPr id="13" name="TextBox 12"/>
+          <p:cNvPr id="12" name="TextBox 11"/>
           <p:cNvSpPr txBox="1"/>
           <p:nvPr/>
         </p:nvSpPr>
@@ -6295,7 +6241,7 @@
       </p:sp>
       <p:pic>
         <p:nvPicPr>
-          <p:cNvPr id="14" name="Picture 13" descr="06_Slide6.png"/>
+          <p:cNvPr id="13" name="Picture 12" descr="06_Slide6.png"/>
           <p:cNvPicPr>
             <a:picLocks noChangeAspect="1"/>
           </p:cNvPicPr>
@@ -6319,7 +6265,7 @@
       </p:pic>
       <p:sp>
         <p:nvSpPr>
-          <p:cNvPr id="15" name="TextBox 14"/>
+          <p:cNvPr id="14" name="TextBox 13"/>
           <p:cNvSpPr txBox="1"/>
           <p:nvPr/>
         </p:nvSpPr>
@@ -6354,7 +6300,7 @@
       </p:sp>
       <p:pic>
         <p:nvPicPr>
-          <p:cNvPr id="16" name="Picture 15" descr="07_Slide7.png"/>
+          <p:cNvPr id="15" name="Picture 14" descr="07_Slide7.png"/>
           <p:cNvPicPr>
             <a:picLocks noChangeAspect="1"/>
           </p:cNvPicPr>
@@ -6378,7 +6324,7 @@
       </p:pic>
       <p:sp>
         <p:nvSpPr>
-          <p:cNvPr id="17" name="TextBox 16"/>
+          <p:cNvPr id="16" name="TextBox 15"/>
           <p:cNvSpPr txBox="1"/>
           <p:nvPr/>
         </p:nvSpPr>
@@ -6413,7 +6359,7 @@
       </p:sp>
       <p:pic>
         <p:nvPicPr>
-          <p:cNvPr id="18" name="Picture 17" descr="08_Slide8.png"/>
+          <p:cNvPr id="17" name="Picture 16" descr="08_Slide8.png"/>
           <p:cNvPicPr>
             <a:picLocks noChangeAspect="1"/>
           </p:cNvPicPr>
@@ -6437,7 +6383,7 @@
       </p:pic>
       <p:sp>
         <p:nvSpPr>
-          <p:cNvPr id="19" name="TextBox 18"/>
+          <p:cNvPr id="18" name="TextBox 17"/>
           <p:cNvSpPr txBox="1"/>
           <p:nvPr/>
         </p:nvSpPr>
@@ -6490,61 +6436,7 @@
       <p:grpSpPr/>
       <p:sp>
         <p:nvSpPr>
-          <p:cNvPr id="2" name="Rectangle 1"/>
-          <p:cNvSpPr/>
-          <p:nvPr/>
-        </p:nvSpPr>
-        <p:spPr>
-          <a:xfrm>
-            <a:off x="0" y="685800"/>
-            <a:ext cx="12192000" cy="137160"/>
-          </a:xfrm>
-          <a:prstGeom prst="rect">
-            <a:avLst/>
-          </a:prstGeom>
-          <a:gradFill rotWithShape="1">
-            <a:gsLst>
-              <a:gs pos="0">
-                <a:srgbClr val="E0E5F7"/>
-              </a:gs>
-              <a:gs pos="100000">
-                <a:srgbClr val="95ABEA"/>
-              </a:gs>
-            </a:gsLst>
-            <a:lin scaled="0" ang="0"/>
-          </a:gradFill>
-          <a:ln w="1">
-            <a:solidFill>
-              <a:srgbClr val="FFFFFF"/>
-            </a:solidFill>
-          </a:ln>
-          <a:effectLst/>
-        </p:spPr>
-        <p:style>
-          <a:lnRef idx="1">
-            <a:schemeClr val="accent1"/>
-          </a:lnRef>
-          <a:fillRef idx="3">
-            <a:schemeClr val="accent1"/>
-          </a:fillRef>
-          <a:effectRef idx="2">
-            <a:schemeClr val="accent1"/>
-          </a:effectRef>
-          <a:fontRef idx="minor">
-            <a:schemeClr val="lt1"/>
-          </a:fontRef>
-        </p:style>
-        <p:txBody>
-          <a:bodyPr rtlCol="0" anchor="ctr"/>
-          <a:lstStyle/>
-          <a:p>
-            <a:pPr algn="ctr"/>
-          </a:p>
-        </p:txBody>
-      </p:sp>
-      <p:sp>
-        <p:nvSpPr>
-          <p:cNvPr id="3" name="TextBox 2"/>
+          <p:cNvPr id="2" name="TextBox 1"/>
           <p:cNvSpPr txBox="1"/>
           <p:nvPr/>
         </p:nvSpPr>
@@ -6579,7 +6471,7 @@
       </p:sp>
       <p:pic>
         <p:nvPicPr>
-          <p:cNvPr id="4" name="Picture 3" descr="05_Slide5.png"/>
+          <p:cNvPr id="3" name="Picture 2" descr="05_Slide5.png"/>
           <p:cNvPicPr>
             <a:picLocks noChangeAspect="1"/>
           </p:cNvPicPr>
@@ -6603,7 +6495,7 @@
       </p:pic>
       <p:sp>
         <p:nvSpPr>
-          <p:cNvPr id="5" name="TextBox 4"/>
+          <p:cNvPr id="4" name="TextBox 3"/>
           <p:cNvSpPr txBox="1"/>
           <p:nvPr/>
         </p:nvSpPr>
@@ -6638,7 +6530,7 @@
       </p:sp>
       <p:pic>
         <p:nvPicPr>
-          <p:cNvPr id="6" name="Picture 5" descr="06_Slide6.png"/>
+          <p:cNvPr id="5" name="Picture 4" descr="06_Slide6.png"/>
           <p:cNvPicPr>
             <a:picLocks noChangeAspect="1"/>
           </p:cNvPicPr>
@@ -6662,7 +6554,7 @@
       </p:pic>
       <p:sp>
         <p:nvSpPr>
-          <p:cNvPr id="7" name="TextBox 6"/>
+          <p:cNvPr id="6" name="TextBox 5"/>
           <p:cNvSpPr txBox="1"/>
           <p:nvPr/>
         </p:nvSpPr>
@@ -6697,7 +6589,7 @@
       </p:sp>
       <p:pic>
         <p:nvPicPr>
-          <p:cNvPr id="8" name="Picture 7" descr="07_Slide7.png"/>
+          <p:cNvPr id="7" name="Picture 6" descr="07_Slide7.png"/>
           <p:cNvPicPr>
             <a:picLocks noChangeAspect="1"/>
           </p:cNvPicPr>
@@ -6721,7 +6613,7 @@
       </p:pic>
       <p:sp>
         <p:nvSpPr>
-          <p:cNvPr id="9" name="TextBox 8"/>
+          <p:cNvPr id="8" name="TextBox 7"/>
           <p:cNvSpPr txBox="1"/>
           <p:nvPr/>
         </p:nvSpPr>
@@ -6756,7 +6648,7 @@
       </p:sp>
       <p:pic>
         <p:nvPicPr>
-          <p:cNvPr id="10" name="Picture 9" descr="08_Slide8.png"/>
+          <p:cNvPr id="9" name="Picture 8" descr="08_Slide8.png"/>
           <p:cNvPicPr>
             <a:picLocks noChangeAspect="1"/>
           </p:cNvPicPr>
@@ -6780,7 +6672,7 @@
       </p:pic>
       <p:sp>
         <p:nvSpPr>
-          <p:cNvPr id="11" name="TextBox 10"/>
+          <p:cNvPr id="10" name="TextBox 9"/>
           <p:cNvSpPr txBox="1"/>
           <p:nvPr/>
         </p:nvSpPr>
@@ -6833,61 +6725,7 @@
       <p:grpSpPr/>
       <p:sp>
         <p:nvSpPr>
-          <p:cNvPr id="2" name="Rectangle 1"/>
-          <p:cNvSpPr/>
-          <p:nvPr/>
-        </p:nvSpPr>
-        <p:spPr>
-          <a:xfrm>
-            <a:off x="0" y="685800"/>
-            <a:ext cx="12192000" cy="137160"/>
-          </a:xfrm>
-          <a:prstGeom prst="rect">
-            <a:avLst/>
-          </a:prstGeom>
-          <a:gradFill rotWithShape="1">
-            <a:gsLst>
-              <a:gs pos="0">
-                <a:srgbClr val="E0E5F7"/>
-              </a:gs>
-              <a:gs pos="100000">
-                <a:srgbClr val="95ABEA"/>
-              </a:gs>
-            </a:gsLst>
-            <a:lin scaled="0" ang="0"/>
-          </a:gradFill>
-          <a:ln w="1">
-            <a:solidFill>
-              <a:srgbClr val="FFFFFF"/>
-            </a:solidFill>
-          </a:ln>
-          <a:effectLst/>
-        </p:spPr>
-        <p:style>
-          <a:lnRef idx="1">
-            <a:schemeClr val="accent1"/>
-          </a:lnRef>
-          <a:fillRef idx="3">
-            <a:schemeClr val="accent1"/>
-          </a:fillRef>
-          <a:effectRef idx="2">
-            <a:schemeClr val="accent1"/>
-          </a:effectRef>
-          <a:fontRef idx="minor">
-            <a:schemeClr val="lt1"/>
-          </a:fontRef>
-        </p:style>
-        <p:txBody>
-          <a:bodyPr rtlCol="0" anchor="ctr"/>
-          <a:lstStyle/>
-          <a:p>
-            <a:pPr algn="ctr"/>
-          </a:p>
-        </p:txBody>
-      </p:sp>
-      <p:sp>
-        <p:nvSpPr>
-          <p:cNvPr id="3" name="TextBox 2"/>
+          <p:cNvPr id="2" name="TextBox 1"/>
           <p:cNvSpPr txBox="1"/>
           <p:nvPr/>
         </p:nvSpPr>
@@ -6920,63 +6758,9 @@
           </a:p>
         </p:txBody>
       </p:sp>
-      <p:sp>
-        <p:nvSpPr>
-          <p:cNvPr id="4" name="Rectangle 3"/>
-          <p:cNvSpPr/>
-          <p:nvPr/>
-        </p:nvSpPr>
-        <p:spPr>
-          <a:xfrm>
-            <a:off x="0" y="685800"/>
-            <a:ext cx="12192000" cy="137160"/>
-          </a:xfrm>
-          <a:prstGeom prst="rect">
-            <a:avLst/>
-          </a:prstGeom>
-          <a:gradFill rotWithShape="1">
-            <a:gsLst>
-              <a:gs pos="0">
-                <a:srgbClr val="E0E5F7"/>
-              </a:gs>
-              <a:gs pos="100000">
-                <a:srgbClr val="95ABEA"/>
-              </a:gs>
-            </a:gsLst>
-            <a:lin scaled="0" ang="0"/>
-          </a:gradFill>
-          <a:ln w="1">
-            <a:solidFill>
-              <a:srgbClr val="FFFFFF"/>
-            </a:solidFill>
-          </a:ln>
-          <a:effectLst/>
-        </p:spPr>
-        <p:style>
-          <a:lnRef idx="1">
-            <a:schemeClr val="accent1"/>
-          </a:lnRef>
-          <a:fillRef idx="3">
-            <a:schemeClr val="accent1"/>
-          </a:fillRef>
-          <a:effectRef idx="2">
-            <a:schemeClr val="accent1"/>
-          </a:effectRef>
-          <a:fontRef idx="minor">
-            <a:schemeClr val="lt1"/>
-          </a:fontRef>
-        </p:style>
-        <p:txBody>
-          <a:bodyPr rtlCol="0" anchor="ctr"/>
-          <a:lstStyle/>
-          <a:p>
-            <a:pPr algn="ctr"/>
-          </a:p>
-        </p:txBody>
-      </p:sp>
       <p:pic>
         <p:nvPicPr>
-          <p:cNvPr id="5" name="Picture 4" descr="01_Slide1.png"/>
+          <p:cNvPr id="3" name="Picture 2" descr="01_Slide1.png"/>
           <p:cNvPicPr>
             <a:picLocks noChangeAspect="1"/>
           </p:cNvPicPr>
@@ -7000,7 +6784,7 @@
       </p:pic>
       <p:pic>
         <p:nvPicPr>
-          <p:cNvPr id="6" name="Picture 5" descr="02_Slide2.png"/>
+          <p:cNvPr id="4" name="Picture 3" descr="02_Slide2.png"/>
           <p:cNvPicPr>
             <a:picLocks noChangeAspect="1"/>
           </p:cNvPicPr>
@@ -7024,7 +6808,7 @@
       </p:pic>
       <p:pic>
         <p:nvPicPr>
-          <p:cNvPr id="7" name="Picture 6" descr="03_Slide3.png"/>
+          <p:cNvPr id="5" name="Picture 4" descr="03_Slide3.png"/>
           <p:cNvPicPr>
             <a:picLocks noChangeAspect="1"/>
           </p:cNvPicPr>
@@ -7048,7 +6832,7 @@
       </p:pic>
       <p:pic>
         <p:nvPicPr>
-          <p:cNvPr id="8" name="Picture 7" descr="04_Slide4.png"/>
+          <p:cNvPr id="6" name="Picture 5" descr="04_Slide4.png"/>
           <p:cNvPicPr>
             <a:picLocks noChangeAspect="1"/>
           </p:cNvPicPr>
@@ -7072,7 +6856,7 @@
       </p:pic>
       <p:pic>
         <p:nvPicPr>
-          <p:cNvPr id="9" name="Picture 8" descr="05_Slide5.png"/>
+          <p:cNvPr id="7" name="Picture 6" descr="05_Slide5.png"/>
           <p:cNvPicPr>
             <a:picLocks noChangeAspect="1"/>
           </p:cNvPicPr>
@@ -7096,7 +6880,7 @@
       </p:pic>
       <p:pic>
         <p:nvPicPr>
-          <p:cNvPr id="10" name="Picture 9" descr="06_Slide6.png"/>
+          <p:cNvPr id="8" name="Picture 7" descr="06_Slide6.png"/>
           <p:cNvPicPr>
             <a:picLocks noChangeAspect="1"/>
           </p:cNvPicPr>
@@ -7120,7 +6904,7 @@
       </p:pic>
       <p:pic>
         <p:nvPicPr>
-          <p:cNvPr id="11" name="Picture 10" descr="07_Slide7.png"/>
+          <p:cNvPr id="9" name="Picture 8" descr="07_Slide7.png"/>
           <p:cNvPicPr>
             <a:picLocks noChangeAspect="1"/>
           </p:cNvPicPr>
@@ -7144,7 +6928,7 @@
       </p:pic>
       <p:pic>
         <p:nvPicPr>
-          <p:cNvPr id="12" name="Picture 11" descr="08_Slide8.png"/>
+          <p:cNvPr id="10" name="Picture 9" descr="08_Slide8.png"/>
           <p:cNvPicPr>
             <a:picLocks noChangeAspect="1"/>
           </p:cNvPicPr>
@@ -7186,61 +6970,7 @@
       <p:grpSpPr/>
       <p:sp>
         <p:nvSpPr>
-          <p:cNvPr id="2" name="Rectangle 1"/>
-          <p:cNvSpPr/>
-          <p:nvPr/>
-        </p:nvSpPr>
-        <p:spPr>
-          <a:xfrm>
-            <a:off x="0" y="685800"/>
-            <a:ext cx="12192000" cy="137160"/>
-          </a:xfrm>
-          <a:prstGeom prst="rect">
-            <a:avLst/>
-          </a:prstGeom>
-          <a:gradFill rotWithShape="1">
-            <a:gsLst>
-              <a:gs pos="0">
-                <a:srgbClr val="E0E5F7"/>
-              </a:gs>
-              <a:gs pos="100000">
-                <a:srgbClr val="95ABEA"/>
-              </a:gs>
-            </a:gsLst>
-            <a:lin scaled="0" ang="0"/>
-          </a:gradFill>
-          <a:ln w="1">
-            <a:solidFill>
-              <a:srgbClr val="FFFFFF"/>
-            </a:solidFill>
-          </a:ln>
-          <a:effectLst/>
-        </p:spPr>
-        <p:style>
-          <a:lnRef idx="1">
-            <a:schemeClr val="accent1"/>
-          </a:lnRef>
-          <a:fillRef idx="3">
-            <a:schemeClr val="accent1"/>
-          </a:fillRef>
-          <a:effectRef idx="2">
-            <a:schemeClr val="accent1"/>
-          </a:effectRef>
-          <a:fontRef idx="minor">
-            <a:schemeClr val="lt1"/>
-          </a:fontRef>
-        </p:style>
-        <p:txBody>
-          <a:bodyPr rtlCol="0" anchor="ctr"/>
-          <a:lstStyle/>
-          <a:p>
-            <a:pPr algn="ctr"/>
-          </a:p>
-        </p:txBody>
-      </p:sp>
-      <p:sp>
-        <p:nvSpPr>
-          <p:cNvPr id="3" name="TextBox 2"/>
+          <p:cNvPr id="2" name="TextBox 1"/>
           <p:cNvSpPr txBox="1"/>
           <p:nvPr/>
         </p:nvSpPr>
@@ -7273,63 +7003,9 @@
           </a:p>
         </p:txBody>
       </p:sp>
-      <p:sp>
-        <p:nvSpPr>
-          <p:cNvPr id="4" name="Rectangle 3"/>
-          <p:cNvSpPr/>
-          <p:nvPr/>
-        </p:nvSpPr>
-        <p:spPr>
-          <a:xfrm>
-            <a:off x="0" y="685800"/>
-            <a:ext cx="12192000" cy="137160"/>
-          </a:xfrm>
-          <a:prstGeom prst="rect">
-            <a:avLst/>
-          </a:prstGeom>
-          <a:gradFill rotWithShape="1">
-            <a:gsLst>
-              <a:gs pos="0">
-                <a:srgbClr val="E0E5F7"/>
-              </a:gs>
-              <a:gs pos="100000">
-                <a:srgbClr val="95ABEA"/>
-              </a:gs>
-            </a:gsLst>
-            <a:lin scaled="0" ang="0"/>
-          </a:gradFill>
-          <a:ln w="1">
-            <a:solidFill>
-              <a:srgbClr val="FFFFFF"/>
-            </a:solidFill>
-          </a:ln>
-          <a:effectLst/>
-        </p:spPr>
-        <p:style>
-          <a:lnRef idx="1">
-            <a:schemeClr val="accent1"/>
-          </a:lnRef>
-          <a:fillRef idx="3">
-            <a:schemeClr val="accent1"/>
-          </a:fillRef>
-          <a:effectRef idx="2">
-            <a:schemeClr val="accent1"/>
-          </a:effectRef>
-          <a:fontRef idx="minor">
-            <a:schemeClr val="lt1"/>
-          </a:fontRef>
-        </p:style>
-        <p:txBody>
-          <a:bodyPr rtlCol="0" anchor="ctr"/>
-          <a:lstStyle/>
-          <a:p>
-            <a:pPr algn="ctr"/>
-          </a:p>
-        </p:txBody>
-      </p:sp>
       <p:pic>
         <p:nvPicPr>
-          <p:cNvPr id="5" name="Picture 4" descr="05_Slide5.png"/>
+          <p:cNvPr id="3" name="Picture 2" descr="05_Slide5.png"/>
           <p:cNvPicPr>
             <a:picLocks noChangeAspect="1"/>
           </p:cNvPicPr>
@@ -7353,7 +7029,7 @@
       </p:pic>
       <p:pic>
         <p:nvPicPr>
-          <p:cNvPr id="6" name="Picture 5" descr="06_Slide6.png"/>
+          <p:cNvPr id="4" name="Picture 3" descr="06_Slide6.png"/>
           <p:cNvPicPr>
             <a:picLocks noChangeAspect="1"/>
           </p:cNvPicPr>
@@ -7377,7 +7053,7 @@
       </p:pic>
       <p:pic>
         <p:nvPicPr>
-          <p:cNvPr id="7" name="Picture 6" descr="07_Slide7.png"/>
+          <p:cNvPr id="5" name="Picture 4" descr="07_Slide7.png"/>
           <p:cNvPicPr>
             <a:picLocks noChangeAspect="1"/>
           </p:cNvPicPr>
@@ -7401,7 +7077,7 @@
       </p:pic>
       <p:pic>
         <p:nvPicPr>
-          <p:cNvPr id="8" name="Picture 7" descr="08_Slide8.png"/>
+          <p:cNvPr id="6" name="Picture 5" descr="08_Slide8.png"/>
           <p:cNvPicPr>
             <a:picLocks noChangeAspect="1"/>
           </p:cNvPicPr>

</xml_diff>